<commit_message>
fix (global) Update ppt
</commit_message>
<xml_diff>
--- a/Presentación1.pptx
+++ b/Presentación1.pptx
@@ -108,6 +108,11 @@
       </a:defRPr>
     </a:lvl9pPr>
   </p:defaultTextStyle>
+  <p:extLst>
+    <p:ext uri="{EFAFB233-063F-42B5-8137-9DF3F51BA10A}">
+      <p15:sldGuideLst xmlns:p15="http://schemas.microsoft.com/office/powerpoint/2012/main"/>
+    </p:ext>
+  </p:extLst>
 </p:presentation>
 </file>
 
@@ -260,7 +265,7 @@
           <a:p>
             <a:fld id="{9E847F82-99DE-4C6B-BDE4-1E5348C9071A}" type="datetimeFigureOut">
               <a:rPr lang="es-CU" smtClean="0"/>
-              <a:t>13/4/2022</a:t>
+              <a:t>14/4/2022</a:t>
             </a:fld>
             <a:endParaRPr lang="es-CU"/>
           </a:p>
@@ -460,7 +465,7 @@
           <a:p>
             <a:fld id="{9E847F82-99DE-4C6B-BDE4-1E5348C9071A}" type="datetimeFigureOut">
               <a:rPr lang="es-CU" smtClean="0"/>
-              <a:t>13/4/2022</a:t>
+              <a:t>14/4/2022</a:t>
             </a:fld>
             <a:endParaRPr lang="es-CU"/>
           </a:p>
@@ -670,7 +675,7 @@
           <a:p>
             <a:fld id="{9E847F82-99DE-4C6B-BDE4-1E5348C9071A}" type="datetimeFigureOut">
               <a:rPr lang="es-CU" smtClean="0"/>
-              <a:t>13/4/2022</a:t>
+              <a:t>14/4/2022</a:t>
             </a:fld>
             <a:endParaRPr lang="es-CU"/>
           </a:p>
@@ -870,7 +875,7 @@
           <a:p>
             <a:fld id="{9E847F82-99DE-4C6B-BDE4-1E5348C9071A}" type="datetimeFigureOut">
               <a:rPr lang="es-CU" smtClean="0"/>
-              <a:t>13/4/2022</a:t>
+              <a:t>14/4/2022</a:t>
             </a:fld>
             <a:endParaRPr lang="es-CU"/>
           </a:p>
@@ -1146,7 +1151,7 @@
           <a:p>
             <a:fld id="{9E847F82-99DE-4C6B-BDE4-1E5348C9071A}" type="datetimeFigureOut">
               <a:rPr lang="es-CU" smtClean="0"/>
-              <a:t>13/4/2022</a:t>
+              <a:t>14/4/2022</a:t>
             </a:fld>
             <a:endParaRPr lang="es-CU"/>
           </a:p>
@@ -1414,7 +1419,7 @@
           <a:p>
             <a:fld id="{9E847F82-99DE-4C6B-BDE4-1E5348C9071A}" type="datetimeFigureOut">
               <a:rPr lang="es-CU" smtClean="0"/>
-              <a:t>13/4/2022</a:t>
+              <a:t>14/4/2022</a:t>
             </a:fld>
             <a:endParaRPr lang="es-CU"/>
           </a:p>
@@ -1829,7 +1834,7 @@
           <a:p>
             <a:fld id="{9E847F82-99DE-4C6B-BDE4-1E5348C9071A}" type="datetimeFigureOut">
               <a:rPr lang="es-CU" smtClean="0"/>
-              <a:t>13/4/2022</a:t>
+              <a:t>14/4/2022</a:t>
             </a:fld>
             <a:endParaRPr lang="es-CU"/>
           </a:p>
@@ -1971,7 +1976,7 @@
           <a:p>
             <a:fld id="{9E847F82-99DE-4C6B-BDE4-1E5348C9071A}" type="datetimeFigureOut">
               <a:rPr lang="es-CU" smtClean="0"/>
-              <a:t>13/4/2022</a:t>
+              <a:t>14/4/2022</a:t>
             </a:fld>
             <a:endParaRPr lang="es-CU"/>
           </a:p>
@@ -2084,7 +2089,7 @@
           <a:p>
             <a:fld id="{9E847F82-99DE-4C6B-BDE4-1E5348C9071A}" type="datetimeFigureOut">
               <a:rPr lang="es-CU" smtClean="0"/>
-              <a:t>13/4/2022</a:t>
+              <a:t>14/4/2022</a:t>
             </a:fld>
             <a:endParaRPr lang="es-CU"/>
           </a:p>
@@ -2397,7 +2402,7 @@
           <a:p>
             <a:fld id="{9E847F82-99DE-4C6B-BDE4-1E5348C9071A}" type="datetimeFigureOut">
               <a:rPr lang="es-CU" smtClean="0"/>
-              <a:t>13/4/2022</a:t>
+              <a:t>14/4/2022</a:t>
             </a:fld>
             <a:endParaRPr lang="es-CU"/>
           </a:p>
@@ -2686,7 +2691,7 @@
           <a:p>
             <a:fld id="{9E847F82-99DE-4C6B-BDE4-1E5348C9071A}" type="datetimeFigureOut">
               <a:rPr lang="es-CU" smtClean="0"/>
-              <a:t>13/4/2022</a:t>
+              <a:t>14/4/2022</a:t>
             </a:fld>
             <a:endParaRPr lang="es-CU"/>
           </a:p>
@@ -2929,7 +2934,7 @@
           <a:p>
             <a:fld id="{9E847F82-99DE-4C6B-BDE4-1E5348C9071A}" type="datetimeFigureOut">
               <a:rPr lang="es-CU" smtClean="0"/>
-              <a:t>13/4/2022</a:t>
+              <a:t>14/4/2022</a:t>
             </a:fld>
             <a:endParaRPr lang="es-CU"/>
           </a:p>
@@ -4654,6 +4659,19 @@
               <a:tabLst/>
             </a:pPr>
             <a:r>
+              <a:rPr kumimoji="0" lang="es-ES" altLang="es-CU" sz="1800" b="0" i="0" u="none" strike="noStrike" cap="none" normalizeH="0" baseline="0">
+                <a:ln>
+                  <a:noFill/>
+                </a:ln>
+                <a:solidFill>
+                  <a:schemeClr val="tx1"/>
+                </a:solidFill>
+                <a:effectLst/>
+                <a:latin typeface="Arial" panose="020B0604020202020204" pitchFamily="34" charset="0"/>
+              </a:rPr>
+              <a:t>Convertir </a:t>
+            </a:r>
+            <a:r>
               <a:rPr kumimoji="0" lang="es-ES" altLang="es-CU" sz="1800" b="0" i="0" u="none" strike="noStrike" cap="none" normalizeH="0" baseline="0" dirty="0">
                 <a:ln>
                   <a:noFill/>
@@ -4664,7 +4682,7 @@
                 <a:effectLst/>
                 <a:latin typeface="Arial" panose="020B0604020202020204" pitchFamily="34" charset="0"/>
               </a:rPr>
-              <a:t>Convertir una un modelo a objeto de </a:t>
+              <a:t>un modelo a objeto de </a:t>
             </a:r>
             <a:r>
               <a:rPr kumimoji="0" lang="es-ES" altLang="es-CU" sz="1800" b="0" i="0" u="none" strike="noStrike" cap="none" normalizeH="0" baseline="0" dirty="0" err="1">

</xml_diff>